<commit_message>
chnane hpc file to make noise copies
</commit_message>
<xml_diff>
--- a/ResearchPresentation2.pptx
+++ b/ResearchPresentation2.pptx
@@ -3387,7 +3387,7 @@
           <a:p>
             <a:fld id="{5F674558-5DAC-4578-BE51-14A16D48415A}" type="datetimeFigureOut">
               <a:rPr lang="en-AU" smtClean="0"/>
-              <a:t>29/1/19</a:t>
+              <a:t>30/1/19</a:t>
             </a:fld>
             <a:endParaRPr lang="en-AU"/>
           </a:p>
@@ -4511,7 +4511,7 @@
             <a:fld id="{5923F103-BC34-4FE4-A40E-EDDEECFDA5D0}" type="datetimeFigureOut">
               <a:rPr lang="en-US" dirty="0"/>
               <a:pPr/>
-              <a:t>1/29/19</a:t>
+              <a:t>1/30/19</a:t>
             </a:fld>
             <a:endParaRPr lang="en-US" dirty="0"/>
           </a:p>
@@ -5599,7 +5599,7 @@
           <a:p>
             <a:fld id="{923A1CC3-2375-41D4-9E03-427CAF2A4C1A}" type="datetimeFigureOut">
               <a:rPr lang="en-US" dirty="0"/>
-              <a:t>1/29/19</a:t>
+              <a:t>1/30/19</a:t>
             </a:fld>
             <a:endParaRPr lang="en-US" dirty="0"/>
           </a:p>
@@ -6579,7 +6579,7 @@
           <a:p>
             <a:fld id="{AFF16868-8199-4C2C-A5B1-63AEE139F88E}" type="datetimeFigureOut">
               <a:rPr lang="en-US" dirty="0"/>
-              <a:t>1/29/19</a:t>
+              <a:t>1/30/19</a:t>
             </a:fld>
             <a:endParaRPr lang="en-US" dirty="0"/>
           </a:p>
@@ -7713,7 +7713,7 @@
           <a:p>
             <a:fld id="{AAD9FF7F-6988-44CC-821B-644E70CD2F73}" type="datetimeFigureOut">
               <a:rPr lang="en-US" dirty="0"/>
-              <a:t>1/29/19</a:t>
+              <a:t>1/30/19</a:t>
             </a:fld>
             <a:endParaRPr lang="en-US" dirty="0"/>
           </a:p>
@@ -8746,7 +8746,7 @@
           <a:p>
             <a:fld id="{5C12C299-16B2-4475-990D-751901EACC14}" type="datetimeFigureOut">
               <a:rPr lang="en-US" dirty="0"/>
-              <a:t>1/29/19</a:t>
+              <a:t>1/30/19</a:t>
             </a:fld>
             <a:endParaRPr lang="en-US" dirty="0"/>
           </a:p>
@@ -9406,7 +9406,7 @@
           <a:p>
             <a:fld id="{9FE86839-B9D8-4651-8783-F325ECE74E65}" type="datetimeFigureOut">
               <a:rPr lang="en-US" dirty="0"/>
-              <a:t>1/29/19</a:t>
+              <a:t>1/30/19</a:t>
             </a:fld>
             <a:endParaRPr lang="en-US" dirty="0"/>
           </a:p>
@@ -10267,7 +10267,7 @@
           <a:p>
             <a:fld id="{FD484F64-32F6-45C5-931F-ADC1662401D0}" type="datetimeFigureOut">
               <a:rPr lang="en-US" dirty="0"/>
-              <a:t>1/29/19</a:t>
+              <a:t>1/30/19</a:t>
             </a:fld>
             <a:endParaRPr lang="en-US" dirty="0"/>
           </a:p>
@@ -10457,7 +10457,7 @@
           <a:p>
             <a:fld id="{53086D93-FCAC-47E0-A2EE-787E62CA814C}" type="datetimeFigureOut">
               <a:rPr lang="en-US" dirty="0"/>
-              <a:t>1/29/19</a:t>
+              <a:t>1/30/19</a:t>
             </a:fld>
             <a:endParaRPr lang="en-US" dirty="0"/>
           </a:p>
@@ -11429,7 +11429,7 @@
           <a:p>
             <a:fld id="{CDA879A6-0FD0-4734-A311-86BFCA472E6E}" type="datetimeFigureOut">
               <a:rPr lang="en-US" dirty="0"/>
-              <a:t>1/29/19</a:t>
+              <a:t>1/30/19</a:t>
             </a:fld>
             <a:endParaRPr lang="en-US" dirty="0"/>
           </a:p>
@@ -11640,7 +11640,7 @@
           <a:p>
             <a:fld id="{19C9CA7B-DFD4-44B5-8C60-D14B8CD1FB59}" type="datetimeFigureOut">
               <a:rPr lang="en-US" dirty="0"/>
-              <a:t>1/29/19</a:t>
+              <a:t>1/30/19</a:t>
             </a:fld>
             <a:endParaRPr lang="en-US" dirty="0"/>
           </a:p>
@@ -12674,7 +12674,7 @@
           <a:p>
             <a:fld id="{F34E6425-0181-43F2-84FC-787E803FD2F8}" type="datetimeFigureOut">
               <a:rPr lang="en-US" dirty="0"/>
-              <a:t>1/29/19</a:t>
+              <a:t>1/30/19</a:t>
             </a:fld>
             <a:endParaRPr lang="en-US" dirty="0"/>
           </a:p>
@@ -12946,7 +12946,7 @@
           <a:p>
             <a:fld id="{3BDB8791-F1B0-41E7-B7FD-A781E65C4266}" type="datetimeFigureOut">
               <a:rPr lang="en-US" dirty="0"/>
-              <a:t>1/29/19</a:t>
+              <a:t>1/30/19</a:t>
             </a:fld>
             <a:endParaRPr lang="en-US" dirty="0"/>
           </a:p>
@@ -13356,7 +13356,7 @@
           <a:p>
             <a:fld id="{5FDD63B2-E120-4ED8-B27B-C685F510A5FE}" type="datetimeFigureOut">
               <a:rPr lang="en-US" dirty="0"/>
-              <a:t>1/29/19</a:t>
+              <a:t>1/30/19</a:t>
             </a:fld>
             <a:endParaRPr lang="en-US" dirty="0"/>
           </a:p>
@@ -13483,7 +13483,7 @@
           <a:p>
             <a:fld id="{7AA18ACC-A947-437B-A130-35BD54FDF1E9}" type="datetimeFigureOut">
               <a:rPr lang="en-US" dirty="0"/>
-              <a:t>1/29/19</a:t>
+              <a:t>1/30/19</a:t>
             </a:fld>
             <a:endParaRPr lang="en-US" dirty="0"/>
           </a:p>
@@ -13578,7 +13578,7 @@
           <a:p>
             <a:fld id="{7C8D7E02-BCB8-4D50-A234-369438C08659}" type="datetimeFigureOut">
               <a:rPr lang="en-US" dirty="0"/>
-              <a:t>1/29/19</a:t>
+              <a:t>1/30/19</a:t>
             </a:fld>
             <a:endParaRPr lang="en-US" dirty="0"/>
           </a:p>
@@ -14659,7 +14659,7 @@
           <a:p>
             <a:fld id="{76E86A4C-8E40-4F87-A4F0-01A0687C5742}" type="datetimeFigureOut">
               <a:rPr lang="en-US" dirty="0"/>
-              <a:t>1/29/19</a:t>
+              <a:t>1/30/19</a:t>
             </a:fld>
             <a:endParaRPr lang="en-US" dirty="0"/>
           </a:p>
@@ -15767,7 +15767,7 @@
           <a:p>
             <a:fld id="{35E72C73-2D91-4E12-BA25-F0AA0C03599B}" type="datetimeFigureOut">
               <a:rPr lang="en-US" dirty="0"/>
-              <a:t>1/29/19</a:t>
+              <a:t>1/30/19</a:t>
             </a:fld>
             <a:endParaRPr lang="en-US" dirty="0"/>
           </a:p>
@@ -16764,7 +16764,7 @@
           <a:p>
             <a:fld id="{2BE451C3-0FF4-47C4-B829-773ADF60F88C}" type="datetimeFigureOut">
               <a:rPr lang="en-US" dirty="0"/>
-              <a:t>1/29/19</a:t>
+              <a:t>1/30/19</a:t>
             </a:fld>
             <a:endParaRPr lang="en-US" dirty="0"/>
           </a:p>
@@ -18834,7 +18834,7 @@
         </p:blipFill>
         <p:spPr bwMode="auto">
           <a:xfrm>
-            <a:off x="2843244" y="3008630"/>
+            <a:off x="1902719" y="3060882"/>
             <a:ext cx="5449824" cy="2606040"/>
           </a:xfrm>
           <a:prstGeom prst="rect">

</xml_diff>

<commit_message>
Added helper function class
</commit_message>
<xml_diff>
--- a/ResearchPresentation2.pptx
+++ b/ResearchPresentation2.pptx
@@ -18251,6 +18251,17 @@
               </a:rPr>
               <a:t></a:t>
             </a:r>
+          </a:p>
+          <a:p>
+            <a:r>
+              <a:rPr lang="en-US" dirty="0">
+                <a:solidFill>
+                  <a:schemeClr val="bg1"/>
+                </a:solidFill>
+                <a:sym typeface="Wingdings" panose="05000000000000000000" pitchFamily="2" charset="2"/>
+              </a:rPr>
+              <a:t>99.33% accurate</a:t>
+            </a:r>
             <a:endParaRPr lang="en-US" dirty="0">
               <a:solidFill>
                 <a:schemeClr val="bg1"/>
@@ -18555,7 +18566,7 @@
         </p:blipFill>
         <p:spPr bwMode="auto">
           <a:xfrm>
-            <a:off x="2843244" y="3008630"/>
+            <a:off x="671160" y="3008630"/>
             <a:ext cx="5449824" cy="2606040"/>
           </a:xfrm>
           <a:prstGeom prst="rect">
@@ -18571,6 +18582,36 @@
               </a14:hiddenFill>
             </a:ext>
           </a:extLst>
+        </p:spPr>
+      </p:pic>
+      <p:pic>
+        <p:nvPicPr>
+          <p:cNvPr id="4" name="Picture 3">
+            <a:extLst>
+              <a:ext uri="{FF2B5EF4-FFF2-40B4-BE49-F238E27FC236}">
+                <a16:creationId xmlns:a16="http://schemas.microsoft.com/office/drawing/2014/main" id="{0D53D988-828A-4625-8D67-DD3418A995E0}"/>
+              </a:ext>
+            </a:extLst>
+          </p:cNvPr>
+          <p:cNvPicPr>
+            <a:picLocks noChangeAspect="1"/>
+          </p:cNvPicPr>
+          <p:nvPr/>
+        </p:nvPicPr>
+        <p:blipFill>
+          <a:blip r:embed="rId3"/>
+          <a:stretch>
+            <a:fillRect/>
+          </a:stretch>
+        </p:blipFill>
+        <p:spPr>
+          <a:xfrm>
+            <a:off x="6444706" y="2583464"/>
+            <a:ext cx="4934639" cy="3696216"/>
+          </a:xfrm>
+          <a:prstGeom prst="rect">
+            <a:avLst/>
+          </a:prstGeom>
         </p:spPr>
       </p:pic>
     </p:spTree>
@@ -18947,6 +18988,53 @@
           </a:p>
         </p:txBody>
       </p:sp>
+      <p:pic>
+        <p:nvPicPr>
+          <p:cNvPr id="2" name="Picture 2" descr="The FunnelWeb Survey">
+            <a:extLst>
+              <a:ext uri="{FF2B5EF4-FFF2-40B4-BE49-F238E27FC236}">
+                <a16:creationId xmlns:a16="http://schemas.microsoft.com/office/drawing/2014/main" id="{3DFC9180-8F28-4818-8E74-5CB1D70FC832}"/>
+              </a:ext>
+            </a:extLst>
+          </p:cNvPr>
+          <p:cNvPicPr>
+            <a:picLocks noChangeAspect="1" noChangeArrowheads="1"/>
+          </p:cNvPicPr>
+          <p:nvPr/>
+        </p:nvPicPr>
+        <p:blipFill>
+          <a:blip r:embed="rId5">
+            <a:extLst>
+              <a:ext uri="{28A0092B-C50C-407E-A947-70E740481C1C}">
+                <a14:useLocalDpi xmlns:a14="http://schemas.microsoft.com/office/drawing/2010/main" val="0"/>
+              </a:ext>
+            </a:extLst>
+          </a:blip>
+          <a:srcRect/>
+          <a:stretch>
+            <a:fillRect/>
+          </a:stretch>
+        </p:blipFill>
+        <p:spPr bwMode="auto">
+          <a:xfrm>
+            <a:off x="11082580" y="5671627"/>
+            <a:ext cx="1122245" cy="1186373"/>
+          </a:xfrm>
+          <a:prstGeom prst="rect">
+            <a:avLst/>
+          </a:prstGeom>
+          <a:noFill/>
+          <a:extLst>
+            <a:ext uri="{909E8E84-426E-40DD-AFC4-6F175D3DCCD1}">
+              <a14:hiddenFill xmlns:a14="http://schemas.microsoft.com/office/drawing/2010/main">
+                <a:solidFill>
+                  <a:srgbClr val="FFFFFF"/>
+                </a:solidFill>
+              </a14:hiddenFill>
+            </a:ext>
+          </a:extLst>
+        </p:spPr>
+      </p:pic>
     </p:spTree>
     <p:extLst>
       <p:ext uri="{BB962C8B-B14F-4D97-AF65-F5344CB8AC3E}">

</xml_diff>